<commit_message>
Added final poster pres
</commit_message>
<xml_diff>
--- a/Präsentation.pptx
+++ b/Präsentation.pptx
@@ -2898,89 +2898,171 @@
             <p:ph type="ctrTitle"/>
           </p:nvPr>
         </p:nvSpPr>
+        <p:spPr>
+          <a:xfrm>
+            <a:off x="1143000" y="2850958"/>
+            <a:ext cx="7101408" cy="1531947"/>
+          </a:xfrm>
+        </p:spPr>
+        <p:txBody>
+          <a:bodyPr>
+            <a:normAutofit/>
+          </a:bodyPr>
+          <a:lstStyle/>
+          <a:p>
+            <a:pPr algn="ctr"/>
+            <a:r>
+              <a:rPr lang="de-DE" sz="3100" dirty="0"/>
+              <a:t>MGMM - </a:t>
+            </a:r>
+            <a:r>
+              <a:rPr lang="de-DE" sz="3100" dirty="0" err="1"/>
+              <a:t>Nanopore</a:t>
+            </a:r>
+            <a:r>
+              <a:rPr lang="de-DE" sz="3100" dirty="0"/>
+              <a:t> </a:t>
+            </a:r>
+            <a:r>
+              <a:rPr lang="de-DE" sz="3100" dirty="0" err="1"/>
+              <a:t>Sequencing</a:t>
+            </a:r>
+            <a:r>
+              <a:rPr lang="de-DE" sz="3100" dirty="0"/>
+              <a:t> Mapper</a:t>
+            </a:r>
+            <a:r>
+              <a:rPr lang="de-DE" dirty="0"/>
+              <a:t/>
+            </a:r>
+            <a:br>
+              <a:rPr lang="de-DE" dirty="0"/>
+            </a:br>
+            <a:r>
+              <a:rPr lang="de-DE" dirty="0" smtClean="0"/>
+              <a:t/>
+            </a:r>
+            <a:br>
+              <a:rPr lang="de-DE" dirty="0" smtClean="0"/>
+            </a:br>
+            <a:r>
+              <a:rPr lang="de-DE" sz="2400" dirty="0" smtClean="0"/>
+              <a:t>A </a:t>
+            </a:r>
+            <a:r>
+              <a:rPr lang="de-DE" sz="2400" dirty="0" err="1"/>
+              <a:t>new</a:t>
+            </a:r>
+            <a:r>
+              <a:rPr lang="de-DE" sz="2400" dirty="0"/>
+              <a:t> </a:t>
+            </a:r>
+            <a:r>
+              <a:rPr lang="de-DE" sz="2400" dirty="0" err="1"/>
+              <a:t>Bowtie-based</a:t>
+            </a:r>
+            <a:r>
+              <a:rPr lang="de-DE" sz="2400" dirty="0"/>
+              <a:t> Mapper </a:t>
+            </a:r>
+            <a:r>
+              <a:rPr lang="de-DE" sz="2400" dirty="0" err="1"/>
+              <a:t>for</a:t>
+            </a:r>
+            <a:r>
+              <a:rPr lang="de-DE" sz="2400" dirty="0"/>
+              <a:t> </a:t>
+            </a:r>
+            <a:r>
+              <a:rPr lang="de-DE" sz="2400" dirty="0" err="1"/>
+              <a:t>long</a:t>
+            </a:r>
+            <a:r>
+              <a:rPr lang="de-DE" sz="2400" dirty="0"/>
+              <a:t> </a:t>
+            </a:r>
+            <a:r>
+              <a:rPr lang="de-DE" sz="2400" dirty="0" err="1"/>
+              <a:t>reads</a:t>
+            </a:r>
+            <a:r>
+              <a:rPr lang="de-DE" sz="2400" dirty="0"/>
+              <a:t> </a:t>
+            </a:r>
+            <a:r>
+              <a:rPr lang="de-DE" sz="2400" dirty="0" err="1"/>
+              <a:t>with</a:t>
+            </a:r>
+            <a:r>
+              <a:rPr lang="de-DE" sz="2400" dirty="0"/>
+              <a:t> high </a:t>
+            </a:r>
+            <a:r>
+              <a:rPr lang="de-DE" sz="2400" dirty="0" err="1"/>
+              <a:t>error</a:t>
+            </a:r>
+            <a:r>
+              <a:rPr lang="de-DE" sz="2400" dirty="0"/>
+              <a:t> rate </a:t>
+            </a:r>
+          </a:p>
+        </p:txBody>
+      </p:sp>
+      <p:sp>
+        <p:nvSpPr>
+          <p:cNvPr id="11" name="Textplatzhalter 10"/>
+          <p:cNvSpPr>
+            <a:spLocks noGrp="1"/>
+          </p:cNvSpPr>
+          <p:nvPr>
+            <p:ph type="body" sz="quarter" idx="10"/>
+          </p:nvPr>
+        </p:nvSpPr>
         <p:spPr/>
         <p:txBody>
           <a:bodyPr/>
           <a:lstStyle/>
           <a:p>
+            <a:pPr algn="ctr"/>
+            <a:r>
+              <a:rPr lang="de-DE" dirty="0"/>
+              <a:t>Ron </a:t>
+            </a:r>
             <a:r>
               <a:rPr lang="de-DE" dirty="0" smtClean="0"/>
-              <a:t>MGMM </a:t>
-            </a:r>
-            <a:r>
-              <a:rPr lang="mr-IN" dirty="0" smtClean="0"/>
-              <a:t>–</a:t>
+              <a:t>Fechtner / </a:t>
+            </a:r>
+            <a:r>
+              <a:rPr lang="de-DE" dirty="0"/>
+              <a:t>Jonas </a:t>
+            </a:r>
+            <a:r>
+              <a:rPr lang="de-DE" dirty="0" err="1"/>
+              <a:t>Galli</a:t>
+            </a:r>
+            <a:r>
+              <a:rPr lang="de-DE" dirty="0"/>
+              <a:t> </a:t>
             </a:r>
             <a:r>
               <a:rPr lang="de-DE" dirty="0" smtClean="0"/>
-              <a:t> A </a:t>
+              <a:t>/ </a:t>
+            </a:r>
+            <a:r>
+              <a:rPr lang="de-DE" dirty="0"/>
+              <a:t>Felix </a:t>
             </a:r>
             <a:r>
               <a:rPr lang="de-DE" dirty="0" err="1" smtClean="0"/>
-              <a:t>long</a:t>
+              <a:t>Offensperger</a:t>
             </a:r>
             <a:r>
               <a:rPr lang="de-DE" dirty="0" smtClean="0"/>
-              <a:t> </a:t>
-            </a:r>
-            <a:r>
-              <a:rPr lang="de-DE" dirty="0" err="1" smtClean="0"/>
-              <a:t>read</a:t>
-            </a:r>
-            <a:r>
-              <a:rPr lang="de-DE" dirty="0" smtClean="0"/>
-              <a:t> </a:t>
-            </a:r>
-            <a:r>
-              <a:rPr lang="de-DE" smtClean="0"/>
-              <a:t>mapper</a:t>
-            </a:r>
-            <a:endParaRPr lang="de-DE" dirty="0"/>
-          </a:p>
-        </p:txBody>
-      </p:sp>
-      <p:sp>
-        <p:nvSpPr>
-          <p:cNvPr id="11" name="Textplatzhalter 10"/>
-          <p:cNvSpPr>
-            <a:spLocks noGrp="1"/>
-          </p:cNvSpPr>
-          <p:nvPr>
-            <p:ph type="body" sz="quarter" idx="10"/>
-          </p:nvPr>
-        </p:nvSpPr>
-        <p:spPr/>
-        <p:txBody>
-          <a:bodyPr/>
-          <a:lstStyle/>
-          <a:p>
-            <a:r>
-              <a:rPr lang="de-DE" dirty="0" smtClean="0"/>
-              <a:t>Florian </a:t>
+              <a:t> / Florian </a:t>
             </a:r>
             <a:r>
               <a:rPr lang="de-DE" dirty="0" err="1" smtClean="0"/>
               <a:t>Tichawa</a:t>
-            </a:r>
-            <a:r>
-              <a:rPr lang="de-DE" dirty="0" smtClean="0"/>
-              <a:t> / Felix </a:t>
-            </a:r>
-            <a:r>
-              <a:rPr lang="de-DE" dirty="0" err="1" smtClean="0"/>
-              <a:t>Offensperger</a:t>
-            </a:r>
-            <a:r>
-              <a:rPr lang="de-DE" dirty="0" smtClean="0"/>
-              <a:t> / Jonas </a:t>
-            </a:r>
-            <a:r>
-              <a:rPr lang="de-DE" dirty="0" err="1" smtClean="0"/>
-              <a:t>Galli</a:t>
-            </a:r>
-            <a:r>
-              <a:rPr lang="de-DE" dirty="0" smtClean="0"/>
-              <a:t> / Ron Fechtner</a:t>
             </a:r>
             <a:endParaRPr lang="de-DE" dirty="0"/>
           </a:p>
@@ -3361,12 +3443,8 @@
           <a:lstStyle/>
           <a:p>
             <a:r>
-              <a:rPr lang="en-US" dirty="0" err="1" smtClean="0"/>
-              <a:t>Nanopore</a:t>
-            </a:r>
-            <a:r>
-              <a:rPr lang="en-US" dirty="0" smtClean="0"/>
-              <a:t> sequencing</a:t>
+              <a:rPr lang="en-US" dirty="0" smtClean="0"/>
+              <a:t>Overview</a:t>
             </a:r>
             <a:endParaRPr lang="en-US" dirty="0"/>
           </a:p>
@@ -3686,8 +3764,12 @@
           <a:lstStyle/>
           <a:p>
             <a:r>
-              <a:rPr lang="en-US" dirty="0" smtClean="0"/>
-              <a:t>Overview</a:t>
+              <a:rPr lang="en-US" dirty="0" err="1"/>
+              <a:t>Nanopore</a:t>
+            </a:r>
+            <a:r>
+              <a:rPr lang="en-US" dirty="0"/>
+              <a:t> sequencing [Ron]</a:t>
             </a:r>
             <a:endParaRPr lang="en-US" dirty="0"/>
           </a:p>

</xml_diff>